<commit_message>
Made a lot of changes to the slideshow (added 3 slides, edited/rearranged others) to add information and more closely model e-mail requirements sent by Peppo 4/10 @ 9am.
</commit_message>
<xml_diff>
--- a/Documentation/Presentation.pptx
+++ b/Documentation/Presentation.pptx
@@ -6,10 +6,13 @@
   </p:sldMasterIdLst>
   <p:sldIdLst>
     <p:sldId id="256" r:id="rId2"/>
-    <p:sldId id="259" r:id="rId3"/>
-    <p:sldId id="260" r:id="rId4"/>
-    <p:sldId id="257" r:id="rId5"/>
-    <p:sldId id="258" r:id="rId6"/>
+    <p:sldId id="261" r:id="rId3"/>
+    <p:sldId id="262" r:id="rId4"/>
+    <p:sldId id="263" r:id="rId5"/>
+    <p:sldId id="260" r:id="rId6"/>
+    <p:sldId id="259" r:id="rId7"/>
+    <p:sldId id="257" r:id="rId8"/>
+    <p:sldId id="258" r:id="rId9"/>
   </p:sldIdLst>
   <p:sldSz cx="9144000" cy="6858000" type="screen4x3"/>
   <p:notesSz cx="6858000" cy="9144000"/>
@@ -3885,14 +3888,40 @@
             <p:ph type="ctrTitle"/>
           </p:nvPr>
         </p:nvSpPr>
-        <p:spPr/>
-        <p:txBody>
-          <a:bodyPr/>
-          <a:lstStyle/>
-          <a:p>
+        <p:spPr>
+          <a:xfrm>
+            <a:off x="533400" y="1143000"/>
+            <a:ext cx="7851648" cy="1828800"/>
+          </a:xfrm>
+        </p:spPr>
+        <p:txBody>
+          <a:bodyPr>
+            <a:normAutofit fontScale="90000"/>
+          </a:bodyPr>
+          <a:lstStyle/>
+          <a:p>
+            <a:r>
+              <a:rPr lang="en-US" dirty="0" err="1" smtClean="0"/>
+              <a:t>MapReduce</a:t>
+            </a:r>
             <a:r>
               <a:rPr lang="en-US" dirty="0" smtClean="0"/>
-              <a:t>CS 647 Map and Reduce Project</a:t>
+              <a:t> </a:t>
+            </a:r>
+            <a:r>
+              <a:rPr lang="en-US" dirty="0" smtClean="0"/>
+              <a:t>and Self-*</a:t>
+            </a:r>
+            <a:br>
+              <a:rPr lang="en-US" dirty="0" smtClean="0"/>
+            </a:br>
+            <a:r>
+              <a:rPr lang="en-US" dirty="0" smtClean="0"/>
+              <a:t> CS 647 </a:t>
+            </a:r>
+            <a:r>
+              <a:rPr lang="en-US" dirty="0" smtClean="0"/>
+              <a:t>Project, Spring 2009</a:t>
             </a:r>
             <a:endParaRPr lang="en-US" dirty="0"/>
           </a:p>
@@ -3996,7 +4025,7 @@
           <a:p>
             <a:r>
               <a:rPr lang="en-US" dirty="0" smtClean="0"/>
-              <a:t>Overview</a:t>
+              <a:t>Research Area</a:t>
             </a:r>
             <a:endParaRPr lang="en-US" dirty="0"/>
           </a:p>
@@ -4019,26 +4048,51 @@
           <a:p>
             <a:r>
               <a:rPr lang="en-US" dirty="0" smtClean="0"/>
-              <a:t>Java console application</a:t>
-            </a:r>
-          </a:p>
-          <a:p>
+              <a:t>Exploring the </a:t>
+            </a:r>
+            <a:r>
+              <a:rPr lang="en-US" dirty="0" err="1" smtClean="0"/>
+              <a:t>MapReduce</a:t>
+            </a:r>
             <a:r>
               <a:rPr lang="en-US" dirty="0" smtClean="0"/>
-              <a:t>Simulation of Map and Reduce system to count the number of words in a file</a:t>
-            </a:r>
+              <a:t> technology</a:t>
+            </a:r>
+          </a:p>
+          <a:p>
+            <a:pPr>
+              <a:buNone/>
+            </a:pPr>
+            <a:endParaRPr lang="en-US" dirty="0" smtClean="0"/>
           </a:p>
           <a:p>
             <a:r>
               <a:rPr lang="en-US" dirty="0" smtClean="0"/>
-              <a:t>Configurable system parameters to influence system behavior</a:t>
-            </a:r>
-          </a:p>
-          <a:p>
+              <a:t>There are multiple Self-* issues that can be addressed to make this type of distributed system more efficient</a:t>
+            </a:r>
+          </a:p>
+          <a:p>
+            <a:pPr lvl="1"/>
+            <a:endParaRPr lang="en-US" dirty="0" smtClean="0"/>
+          </a:p>
+          <a:p>
+            <a:pPr lvl="1"/>
             <a:r>
               <a:rPr lang="en-US" dirty="0" smtClean="0"/>
-              <a:t>Simulate various scenarios such as faults, worker performance, etc to exercise self adaptation</a:t>
-            </a:r>
+              <a:t>Issues regarding if nodes perform horribly compared to its peer worker nodes</a:t>
+            </a:r>
+          </a:p>
+          <a:p>
+            <a:pPr lvl="1"/>
+            <a:endParaRPr lang="en-US" dirty="0" smtClean="0"/>
+          </a:p>
+          <a:p>
+            <a:pPr lvl="1"/>
+            <a:r>
+              <a:rPr lang="en-US" dirty="0" smtClean="0"/>
+              <a:t>Issues regarding if nodes fail completely, not performing its workload</a:t>
+            </a:r>
+            <a:endParaRPr lang="en-US" dirty="0"/>
           </a:p>
         </p:txBody>
       </p:sp>
@@ -4047,13 +4101,6 @@
   <p:clrMapOvr>
     <a:masterClrMapping/>
   </p:clrMapOvr>
-  <p:timing>
-    <p:tnLst>
-      <p:par>
-        <p:cTn id="1" dur="indefinite" restart="never" nodeType="tmRoot"/>
-      </p:par>
-    </p:tnLst>
-  </p:timing>
 </p:sld>
 </file>
 
@@ -4091,7 +4138,7 @@
           <a:p>
             <a:r>
               <a:rPr lang="en-US" dirty="0" smtClean="0"/>
-              <a:t>Self Adaptation</a:t>
+              <a:t>Problem and Interest</a:t>
             </a:r>
             <a:endParaRPr lang="en-US" dirty="0"/>
           </a:p>
@@ -4114,53 +4161,32 @@
           <a:p>
             <a:r>
               <a:rPr lang="en-US" dirty="0" smtClean="0"/>
-              <a:t>Self Healing</a:t>
+              <a:t>When the work is split up between multiple nodes, only as good as the weakest link</a:t>
             </a:r>
           </a:p>
           <a:p>
             <a:pPr lvl="1"/>
             <a:r>
               <a:rPr lang="en-US" dirty="0" smtClean="0"/>
-              <a:t>Monitoring of worker nodes</a:t>
+              <a:t>How can we analyze this to make task faster than the weakest link?</a:t>
+            </a:r>
+          </a:p>
+          <a:p>
+            <a:endParaRPr lang="en-US" dirty="0" smtClean="0"/>
+          </a:p>
+          <a:p>
+            <a:r>
+              <a:rPr lang="en-US" dirty="0" smtClean="0"/>
+              <a:t>When nodes go down, their work is lost, which can cause a huge delay</a:t>
             </a:r>
           </a:p>
           <a:p>
             <a:pPr lvl="1"/>
             <a:r>
               <a:rPr lang="en-US" dirty="0" smtClean="0"/>
-              <a:t>Upon failure, worker computation is redistributed</a:t>
-            </a:r>
-          </a:p>
-          <a:p>
-            <a:pPr lvl="1"/>
-            <a:r>
-              <a:rPr lang="en-US" dirty="0" smtClean="0"/>
-              <a:t>Seamless completion despite single failure</a:t>
-            </a:r>
-          </a:p>
-          <a:p>
-            <a:r>
-              <a:rPr lang="en-US" dirty="0" smtClean="0"/>
-              <a:t>Self Optimization</a:t>
-            </a:r>
-          </a:p>
-          <a:p>
-            <a:pPr lvl="1"/>
-            <a:r>
-              <a:rPr lang="en-US" dirty="0" smtClean="0"/>
-              <a:t>Evaluation of performance of worker node</a:t>
-            </a:r>
-          </a:p>
-          <a:p>
-            <a:pPr lvl="1"/>
-            <a:r>
-              <a:rPr lang="en-US" dirty="0" smtClean="0"/>
-              <a:t>Reallocation of computation to increase performance</a:t>
-            </a:r>
-          </a:p>
-          <a:p>
-            <a:pPr lvl="1"/>
-            <a:endParaRPr lang="en-US" dirty="0" smtClean="0"/>
+              <a:t>How can these nodes be watched to ensure if they fail, the delay time is not catastrophic?</a:t>
+            </a:r>
+            <a:endParaRPr lang="en-US" dirty="0"/>
           </a:p>
         </p:txBody>
       </p:sp>
@@ -4169,13 +4195,6 @@
   <p:clrMapOvr>
     <a:masterClrMapping/>
   </p:clrMapOvr>
-  <p:timing>
-    <p:tnLst>
-      <p:par>
-        <p:cTn id="1" dur="indefinite" restart="never" nodeType="tmRoot"/>
-      </p:par>
-    </p:tnLst>
-  </p:timing>
 </p:sld>
 </file>
 
@@ -4208,12 +4227,393 @@
         </p:nvSpPr>
         <p:spPr/>
         <p:txBody>
+          <a:bodyPr>
+            <a:normAutofit fontScale="90000"/>
+          </a:bodyPr>
+          <a:lstStyle/>
+          <a:p>
+            <a:r>
+              <a:rPr lang="en-US" dirty="0" smtClean="0"/>
+              <a:t>Relevant Work and Technologies</a:t>
+            </a:r>
+            <a:endParaRPr lang="en-US" dirty="0"/>
+          </a:p>
+        </p:txBody>
+      </p:sp>
+      <p:sp>
+        <p:nvSpPr>
+          <p:cNvPr id="3" name="Content Placeholder 2"/>
+          <p:cNvSpPr>
+            <a:spLocks noGrp="1"/>
+          </p:cNvSpPr>
+          <p:nvPr>
+            <p:ph idx="1"/>
+          </p:nvPr>
+        </p:nvSpPr>
+        <p:spPr/>
+        <p:txBody>
           <a:bodyPr/>
           <a:lstStyle/>
           <a:p>
             <a:r>
+              <a:rPr lang="en-US" dirty="0" err="1" smtClean="0"/>
+              <a:t>Hadoop</a:t>
+            </a:r>
+            <a:r>
               <a:rPr lang="en-US" dirty="0" smtClean="0"/>
-              <a:t>System Block Diagram</a:t>
+              <a:t> – Apache Java software framework </a:t>
+            </a:r>
+          </a:p>
+          <a:p>
+            <a:endParaRPr lang="en-US" dirty="0" smtClean="0"/>
+          </a:p>
+          <a:p>
+            <a:r>
+              <a:rPr lang="en-US" dirty="0" err="1" smtClean="0"/>
+              <a:t>Skynet</a:t>
+            </a:r>
+            <a:r>
+              <a:rPr lang="en-US" dirty="0" smtClean="0"/>
+              <a:t> – Ruby </a:t>
+            </a:r>
+            <a:r>
+              <a:rPr lang="en-US" dirty="0" err="1" smtClean="0"/>
+              <a:t>MapReduce</a:t>
+            </a:r>
+            <a:r>
+              <a:rPr lang="en-US" dirty="0" smtClean="0"/>
+              <a:t> framework</a:t>
+            </a:r>
+          </a:p>
+          <a:p>
+            <a:endParaRPr lang="en-US" dirty="0" smtClean="0"/>
+          </a:p>
+          <a:p>
+            <a:r>
+              <a:rPr lang="en-US" dirty="0" smtClean="0"/>
+              <a:t>TODO – WHY ARE THEIR SOLUTIONS NOT FULLY ADDRESSING THE PROBLEM?</a:t>
+            </a:r>
+            <a:endParaRPr lang="en-US" dirty="0"/>
+          </a:p>
+        </p:txBody>
+      </p:sp>
+    </p:spTree>
+  </p:cSld>
+  <p:clrMapOvr>
+    <a:masterClrMapping/>
+  </p:clrMapOvr>
+</p:sld>
+</file>
+
+<file path=ppt/slides/slide5.xml><?xml version="1.0" encoding="utf-8"?>
+<p:sld xmlns:a="http://schemas.openxmlformats.org/drawingml/2006/main" xmlns:r="http://schemas.openxmlformats.org/officeDocument/2006/relationships" xmlns:p="http://schemas.openxmlformats.org/presentationml/2006/main">
+  <p:cSld>
+    <p:spTree>
+      <p:nvGrpSpPr>
+        <p:cNvPr id="1" name=""/>
+        <p:cNvGrpSpPr/>
+        <p:nvPr/>
+      </p:nvGrpSpPr>
+      <p:grpSpPr>
+        <a:xfrm>
+          <a:off x="0" y="0"/>
+          <a:ext cx="0" cy="0"/>
+          <a:chOff x="0" y="0"/>
+          <a:chExt cx="0" cy="0"/>
+        </a:xfrm>
+      </p:grpSpPr>
+      <p:sp>
+        <p:nvSpPr>
+          <p:cNvPr id="2" name="Title 1"/>
+          <p:cNvSpPr>
+            <a:spLocks noGrp="1"/>
+          </p:cNvSpPr>
+          <p:nvPr>
+            <p:ph type="title"/>
+          </p:nvPr>
+        </p:nvSpPr>
+        <p:spPr/>
+        <p:txBody>
+          <a:bodyPr/>
+          <a:lstStyle/>
+          <a:p>
+            <a:r>
+              <a:rPr lang="en-US" dirty="0" smtClean="0"/>
+              <a:t>Self </a:t>
+            </a:r>
+            <a:r>
+              <a:rPr lang="en-US" dirty="0" smtClean="0"/>
+              <a:t>Adaptation Solutions</a:t>
+            </a:r>
+            <a:endParaRPr lang="en-US" dirty="0"/>
+          </a:p>
+        </p:txBody>
+      </p:sp>
+      <p:sp>
+        <p:nvSpPr>
+          <p:cNvPr id="3" name="Content Placeholder 2"/>
+          <p:cNvSpPr>
+            <a:spLocks noGrp="1"/>
+          </p:cNvSpPr>
+          <p:nvPr>
+            <p:ph idx="1"/>
+          </p:nvPr>
+        </p:nvSpPr>
+        <p:spPr/>
+        <p:txBody>
+          <a:bodyPr/>
+          <a:lstStyle/>
+          <a:p>
+            <a:r>
+              <a:rPr lang="en-US" dirty="0" smtClean="0"/>
+              <a:t>Self Healing</a:t>
+            </a:r>
+          </a:p>
+          <a:p>
+            <a:pPr lvl="1"/>
+            <a:r>
+              <a:rPr lang="en-US" dirty="0" smtClean="0"/>
+              <a:t>Monitoring of worker nodes</a:t>
+            </a:r>
+          </a:p>
+          <a:p>
+            <a:pPr lvl="1"/>
+            <a:r>
+              <a:rPr lang="en-US" dirty="0" smtClean="0"/>
+              <a:t>Upon failure, worker computation is redistributed</a:t>
+            </a:r>
+          </a:p>
+          <a:p>
+            <a:pPr lvl="1"/>
+            <a:r>
+              <a:rPr lang="en-US" dirty="0" smtClean="0"/>
+              <a:t>Seamless completion despite single </a:t>
+            </a:r>
+            <a:r>
+              <a:rPr lang="en-US" dirty="0" smtClean="0"/>
+              <a:t>failure</a:t>
+            </a:r>
+          </a:p>
+          <a:p>
+            <a:pPr lvl="1"/>
+            <a:endParaRPr lang="en-US" dirty="0" smtClean="0"/>
+          </a:p>
+          <a:p>
+            <a:r>
+              <a:rPr lang="en-US" dirty="0" smtClean="0"/>
+              <a:t>Self Optimization</a:t>
+            </a:r>
+          </a:p>
+          <a:p>
+            <a:pPr lvl="1"/>
+            <a:r>
+              <a:rPr lang="en-US" dirty="0" smtClean="0"/>
+              <a:t>Evaluation of performance of worker node</a:t>
+            </a:r>
+          </a:p>
+          <a:p>
+            <a:pPr lvl="1"/>
+            <a:r>
+              <a:rPr lang="en-US" dirty="0" smtClean="0"/>
+              <a:t>Reallocation of computation to increase performance</a:t>
+            </a:r>
+          </a:p>
+          <a:p>
+            <a:pPr lvl="1"/>
+            <a:r>
+              <a:rPr lang="en-US" dirty="0" smtClean="0"/>
+              <a:t>Performance greater than “weakest node”</a:t>
+            </a:r>
+            <a:endParaRPr lang="en-US" dirty="0" smtClean="0"/>
+          </a:p>
+        </p:txBody>
+      </p:sp>
+    </p:spTree>
+  </p:cSld>
+  <p:clrMapOvr>
+    <a:masterClrMapping/>
+  </p:clrMapOvr>
+  <p:timing>
+    <p:tnLst>
+      <p:par>
+        <p:cTn id="1" dur="indefinite" restart="never" nodeType="tmRoot"/>
+      </p:par>
+    </p:tnLst>
+  </p:timing>
+</p:sld>
+</file>
+
+<file path=ppt/slides/slide6.xml><?xml version="1.0" encoding="utf-8"?>
+<p:sld xmlns:a="http://schemas.openxmlformats.org/drawingml/2006/main" xmlns:r="http://schemas.openxmlformats.org/officeDocument/2006/relationships" xmlns:p="http://schemas.openxmlformats.org/presentationml/2006/main">
+  <p:cSld>
+    <p:spTree>
+      <p:nvGrpSpPr>
+        <p:cNvPr id="1" name=""/>
+        <p:cNvGrpSpPr/>
+        <p:nvPr/>
+      </p:nvGrpSpPr>
+      <p:grpSpPr>
+        <a:xfrm>
+          <a:off x="0" y="0"/>
+          <a:ext cx="0" cy="0"/>
+          <a:chOff x="0" y="0"/>
+          <a:chExt cx="0" cy="0"/>
+        </a:xfrm>
+      </p:grpSpPr>
+      <p:sp>
+        <p:nvSpPr>
+          <p:cNvPr id="2" name="Title 1"/>
+          <p:cNvSpPr>
+            <a:spLocks noGrp="1"/>
+          </p:cNvSpPr>
+          <p:nvPr>
+            <p:ph type="title"/>
+          </p:nvPr>
+        </p:nvSpPr>
+        <p:spPr/>
+        <p:txBody>
+          <a:bodyPr>
+            <a:normAutofit fontScale="90000"/>
+          </a:bodyPr>
+          <a:lstStyle/>
+          <a:p>
+            <a:r>
+              <a:rPr lang="en-US" dirty="0" smtClean="0"/>
+              <a:t>Implementation Solution Overview</a:t>
+            </a:r>
+            <a:endParaRPr lang="en-US" dirty="0"/>
+          </a:p>
+        </p:txBody>
+      </p:sp>
+      <p:sp>
+        <p:nvSpPr>
+          <p:cNvPr id="3" name="Content Placeholder 2"/>
+          <p:cNvSpPr>
+            <a:spLocks noGrp="1"/>
+          </p:cNvSpPr>
+          <p:nvPr>
+            <p:ph idx="1"/>
+          </p:nvPr>
+        </p:nvSpPr>
+        <p:spPr/>
+        <p:txBody>
+          <a:bodyPr>
+            <a:normAutofit lnSpcReduction="10000"/>
+          </a:bodyPr>
+          <a:lstStyle/>
+          <a:p>
+            <a:r>
+              <a:rPr lang="en-US" dirty="0" smtClean="0"/>
+              <a:t>Create a Java </a:t>
+            </a:r>
+            <a:r>
+              <a:rPr lang="en-US" dirty="0" smtClean="0"/>
+              <a:t>console </a:t>
+            </a:r>
+            <a:r>
+              <a:rPr lang="en-US" dirty="0" smtClean="0"/>
+              <a:t>application</a:t>
+            </a:r>
+          </a:p>
+          <a:p>
+            <a:endParaRPr lang="en-US" dirty="0" smtClean="0"/>
+          </a:p>
+          <a:p>
+            <a:r>
+              <a:rPr lang="en-US" dirty="0" smtClean="0"/>
+              <a:t>Simulation of Map and Reduce system to count the number of words in a </a:t>
+            </a:r>
+            <a:r>
+              <a:rPr lang="en-US" dirty="0" smtClean="0"/>
+              <a:t>file</a:t>
+            </a:r>
+          </a:p>
+          <a:p>
+            <a:endParaRPr lang="en-US" dirty="0" smtClean="0"/>
+          </a:p>
+          <a:p>
+            <a:r>
+              <a:rPr lang="en-US" dirty="0" smtClean="0"/>
+              <a:t>Configurable system parameters to influence system </a:t>
+            </a:r>
+            <a:r>
+              <a:rPr lang="en-US" dirty="0" smtClean="0"/>
+              <a:t>behavior</a:t>
+            </a:r>
+          </a:p>
+          <a:p>
+            <a:endParaRPr lang="en-US" dirty="0" smtClean="0"/>
+          </a:p>
+          <a:p>
+            <a:r>
+              <a:rPr lang="en-US" dirty="0" smtClean="0"/>
+              <a:t>Simulate various scenarios such as faults, worker performance, </a:t>
+            </a:r>
+            <a:r>
+              <a:rPr lang="en-US" dirty="0" smtClean="0"/>
+              <a:t>etc. </a:t>
+            </a:r>
+            <a:r>
+              <a:rPr lang="en-US" dirty="0" smtClean="0"/>
+              <a:t>to exercise self adaptation</a:t>
+            </a:r>
+          </a:p>
+        </p:txBody>
+      </p:sp>
+    </p:spTree>
+  </p:cSld>
+  <p:clrMapOvr>
+    <a:masterClrMapping/>
+  </p:clrMapOvr>
+  <p:timing>
+    <p:tnLst>
+      <p:par>
+        <p:cTn id="1" dur="indefinite" restart="never" nodeType="tmRoot"/>
+      </p:par>
+    </p:tnLst>
+  </p:timing>
+</p:sld>
+</file>
+
+<file path=ppt/slides/slide7.xml><?xml version="1.0" encoding="utf-8"?>
+<p:sld xmlns:a="http://schemas.openxmlformats.org/drawingml/2006/main" xmlns:r="http://schemas.openxmlformats.org/officeDocument/2006/relationships" xmlns:p="http://schemas.openxmlformats.org/presentationml/2006/main">
+  <p:cSld>
+    <p:spTree>
+      <p:nvGrpSpPr>
+        <p:cNvPr id="1" name=""/>
+        <p:cNvGrpSpPr/>
+        <p:nvPr/>
+      </p:nvGrpSpPr>
+      <p:grpSpPr>
+        <a:xfrm>
+          <a:off x="0" y="0"/>
+          <a:ext cx="0" cy="0"/>
+          <a:chOff x="0" y="0"/>
+          <a:chExt cx="0" cy="0"/>
+        </a:xfrm>
+      </p:grpSpPr>
+      <p:sp>
+        <p:nvSpPr>
+          <p:cNvPr id="2" name="Title 1"/>
+          <p:cNvSpPr>
+            <a:spLocks noGrp="1"/>
+          </p:cNvSpPr>
+          <p:nvPr>
+            <p:ph type="title"/>
+          </p:nvPr>
+        </p:nvSpPr>
+        <p:spPr/>
+        <p:txBody>
+          <a:bodyPr/>
+          <a:lstStyle/>
+          <a:p>
+            <a:r>
+              <a:rPr lang="en-US" dirty="0" smtClean="0"/>
+              <a:t>Implementation </a:t>
+            </a:r>
+            <a:r>
+              <a:rPr lang="en-US" dirty="0" smtClean="0"/>
+              <a:t>Block Diagram</a:t>
             </a:r>
             <a:endParaRPr lang="en-US" dirty="0"/>
           </a:p>
@@ -4271,7 +4671,7 @@
         </p:xfrm>
         <a:graphic>
           <a:graphicData uri="http://schemas.openxmlformats.org/presentationml/2006/ole">
-            <p:oleObj spid="_x0000_s25601" r:id="rId3" imgW="5841111" imgH="4195191" progId="Visio.Drawing.11">
+            <p:oleObj spid="_x0000_s25601" r:id="rId3" imgW="5841111" imgH="4195191" progId="">
               <p:embed/>
             </p:oleObj>
           </a:graphicData>
@@ -4292,7 +4692,7 @@
 </p:sld>
 </file>
 
-<file path=ppt/slides/slide5.xml><?xml version="1.0" encoding="utf-8"?>
+<file path=ppt/slides/slide8.xml><?xml version="1.0" encoding="utf-8"?>
 <p:sld xmlns:a="http://schemas.openxmlformats.org/drawingml/2006/main" xmlns:r="http://schemas.openxmlformats.org/officeDocument/2006/relationships" xmlns:p="http://schemas.openxmlformats.org/presentationml/2006/main">
   <p:cSld>
     <p:spTree>
@@ -4321,14 +4721,20 @@
         </p:nvSpPr>
         <p:spPr/>
         <p:txBody>
-          <a:bodyPr/>
-          <a:lstStyle/>
-          <a:p>
-            <a:r>
-              <a:rPr lang="en-US" dirty="0" smtClean="0"/>
-              <a:t>System Flow Block Diagram</a:t>
-            </a:r>
-            <a:endParaRPr lang="en-US" dirty="0"/>
+          <a:bodyPr>
+            <a:normAutofit/>
+          </a:bodyPr>
+          <a:lstStyle/>
+          <a:p>
+            <a:r>
+              <a:rPr lang="en-US" sz="4400" dirty="0" smtClean="0"/>
+              <a:t>Implementation Flow </a:t>
+            </a:r>
+            <a:r>
+              <a:rPr lang="en-US" sz="4400" dirty="0" smtClean="0"/>
+              <a:t>Block Diagram</a:t>
+            </a:r>
+            <a:endParaRPr lang="en-US" sz="4400" dirty="0"/>
           </a:p>
         </p:txBody>
       </p:sp>
@@ -4422,7 +4828,7 @@
         </p:xfrm>
         <a:graphic>
           <a:graphicData uri="http://schemas.openxmlformats.org/presentationml/2006/ole">
-            <p:oleObj spid="_x0000_s39939" r:id="rId3" imgW="6915531" imgH="6298311" progId="Visio.Drawing.11">
+            <p:oleObj spid="_x0000_s39939" r:id="rId3" imgW="6915531" imgH="6298311" progId="">
               <p:embed/>
             </p:oleObj>
           </a:graphicData>

</xml_diff>

<commit_message>
Made some minor changes to pre-proposal, added some TODO comments on the bottom for you guys to review. Please let me know what you think. :-)
</commit_message>
<xml_diff>
--- a/Documentation/Presentation.pptx
+++ b/Documentation/Presentation.pptx
@@ -3906,22 +3906,14 @@
             </a:r>
             <a:r>
               <a:rPr lang="en-US" dirty="0" smtClean="0"/>
-              <a:t> </a:t>
-            </a:r>
-            <a:r>
-              <a:rPr lang="en-US" dirty="0" smtClean="0"/>
-              <a:t>and Self-*</a:t>
+              <a:t> and Self-*</a:t>
             </a:r>
             <a:br>
               <a:rPr lang="en-US" dirty="0" smtClean="0"/>
             </a:br>
             <a:r>
               <a:rPr lang="en-US" dirty="0" smtClean="0"/>
-              <a:t> CS 647 </a:t>
-            </a:r>
-            <a:r>
-              <a:rPr lang="en-US" dirty="0" smtClean="0"/>
-              <a:t>Project, Spring 2009</a:t>
+              <a:t> CS 647 Project, Spring 2009</a:t>
             </a:r>
             <a:endParaRPr lang="en-US" dirty="0"/>
           </a:p>
@@ -4290,10 +4282,18 @@
           </a:p>
           <a:p>
             <a:r>
-              <a:rPr lang="en-US" dirty="0" smtClean="0"/>
+              <a:rPr lang="en-US" dirty="0" smtClean="0">
+                <a:solidFill>
+                  <a:srgbClr val="FF0000"/>
+                </a:solidFill>
+              </a:rPr>
               <a:t>TODO – WHY ARE THEIR SOLUTIONS NOT FULLY ADDRESSING THE PROBLEM?</a:t>
             </a:r>
-            <a:endParaRPr lang="en-US" dirty="0"/>
+            <a:endParaRPr lang="en-US" dirty="0">
+              <a:solidFill>
+                <a:srgbClr val="FF0000"/>
+              </a:solidFill>
+            </a:endParaRPr>
           </a:p>
         </p:txBody>
       </p:sp>
@@ -4339,11 +4339,7 @@
           <a:p>
             <a:r>
               <a:rPr lang="en-US" dirty="0" smtClean="0"/>
-              <a:t>Self </a:t>
-            </a:r>
-            <a:r>
-              <a:rPr lang="en-US" dirty="0" smtClean="0"/>
-              <a:t>Adaptation Solutions</a:t>
+              <a:t>Self Adaptation Solutions</a:t>
             </a:r>
             <a:endParaRPr lang="en-US" dirty="0"/>
           </a:p>
@@ -4387,11 +4383,7 @@
             <a:pPr lvl="1"/>
             <a:r>
               <a:rPr lang="en-US" dirty="0" smtClean="0"/>
-              <a:t>Seamless completion despite single </a:t>
-            </a:r>
-            <a:r>
-              <a:rPr lang="en-US" dirty="0" smtClean="0"/>
-              <a:t>failure</a:t>
+              <a:t>Seamless completion despite single failure</a:t>
             </a:r>
           </a:p>
           <a:p>
@@ -4424,7 +4416,6 @@
               <a:rPr lang="en-US" dirty="0" smtClean="0"/>
               <a:t>Performance greater than “weakest node”</a:t>
             </a:r>
-            <a:endParaRPr lang="en-US" dirty="0" smtClean="0"/>
           </a:p>
         </p:txBody>
       </p:sp>
@@ -4504,15 +4495,25 @@
           <a:p>
             <a:r>
               <a:rPr lang="en-US" dirty="0" smtClean="0"/>
-              <a:t>Create a Java </a:t>
-            </a:r>
+              <a:t>Create a Java console application</a:t>
+            </a:r>
+          </a:p>
+          <a:p>
+            <a:endParaRPr lang="en-US" dirty="0" smtClean="0"/>
+          </a:p>
+          <a:p>
             <a:r>
               <a:rPr lang="en-US" dirty="0" smtClean="0"/>
-              <a:t>console </a:t>
-            </a:r>
+              <a:t>Simulation of Map and Reduce system to count the number of words in a file</a:t>
+            </a:r>
+          </a:p>
+          <a:p>
+            <a:endParaRPr lang="en-US" dirty="0" smtClean="0"/>
+          </a:p>
+          <a:p>
             <a:r>
               <a:rPr lang="en-US" dirty="0" smtClean="0"/>
-              <a:t>application</a:t>
+              <a:t>Configurable system parameters to influence system behavior</a:t>
             </a:r>
           </a:p>
           <a:p>
@@ -4521,41 +4522,7 @@
           <a:p>
             <a:r>
               <a:rPr lang="en-US" dirty="0" smtClean="0"/>
-              <a:t>Simulation of Map and Reduce system to count the number of words in a </a:t>
-            </a:r>
-            <a:r>
-              <a:rPr lang="en-US" dirty="0" smtClean="0"/>
-              <a:t>file</a:t>
-            </a:r>
-          </a:p>
-          <a:p>
-            <a:endParaRPr lang="en-US" dirty="0" smtClean="0"/>
-          </a:p>
-          <a:p>
-            <a:r>
-              <a:rPr lang="en-US" dirty="0" smtClean="0"/>
-              <a:t>Configurable system parameters to influence system </a:t>
-            </a:r>
-            <a:r>
-              <a:rPr lang="en-US" dirty="0" smtClean="0"/>
-              <a:t>behavior</a:t>
-            </a:r>
-          </a:p>
-          <a:p>
-            <a:endParaRPr lang="en-US" dirty="0" smtClean="0"/>
-          </a:p>
-          <a:p>
-            <a:r>
-              <a:rPr lang="en-US" dirty="0" smtClean="0"/>
-              <a:t>Simulate various scenarios such as faults, worker performance, </a:t>
-            </a:r>
-            <a:r>
-              <a:rPr lang="en-US" dirty="0" smtClean="0"/>
-              <a:t>etc. </a:t>
-            </a:r>
-            <a:r>
-              <a:rPr lang="en-US" dirty="0" smtClean="0"/>
-              <a:t>to exercise self adaptation</a:t>
+              <a:t>Simulate various scenarios such as faults, worker performance, etc. to exercise self adaptation</a:t>
             </a:r>
           </a:p>
         </p:txBody>
@@ -4609,11 +4576,7 @@
           <a:p>
             <a:r>
               <a:rPr lang="en-US" dirty="0" smtClean="0"/>
-              <a:t>Implementation </a:t>
-            </a:r>
-            <a:r>
-              <a:rPr lang="en-US" dirty="0" smtClean="0"/>
-              <a:t>Block Diagram</a:t>
+              <a:t>Implementation Block Diagram</a:t>
             </a:r>
             <a:endParaRPr lang="en-US" dirty="0"/>
           </a:p>
@@ -4728,11 +4691,7 @@
           <a:p>
             <a:r>
               <a:rPr lang="en-US" sz="4400" dirty="0" smtClean="0"/>
-              <a:t>Implementation Flow </a:t>
-            </a:r>
-            <a:r>
-              <a:rPr lang="en-US" sz="4400" dirty="0" smtClean="0"/>
-              <a:t>Block Diagram</a:t>
+              <a:t>Implementation Flow Block Diagram</a:t>
             </a:r>
             <a:endParaRPr lang="en-US" sz="4400" dirty="0"/>
           </a:p>

</xml_diff>